<commit_message>
Added info on show analysis
</commit_message>
<xml_diff>
--- a/EDA_group_slides.pptx
+++ b/EDA_group_slides.pptx
@@ -284,6 +284,9 @@
         </p15:guide>
       </p15:sldGuideLst>
     </p:ext>
+    <p:ext uri="{2D200454-40CA-4A62-9FC3-DE9A4176ACB9}">
+      <p15:notesGuideLst xmlns:p15="http://schemas.microsoft.com/office/powerpoint/2012/main"/>
+    </p:ext>
   </p:extLst>
 </p:presentation>
 </file>
@@ -382,7 +385,7 @@
           <a:p>
             <a:fld id="{B9D76C9E-92E3-465F-A8DB-6D552604971A}" type="datetimeFigureOut">
               <a:rPr lang="en-US" smtClean="0"/>
-              <a:t>3/13/2023</a:t>
+              <a:t>3/16/2023</a:t>
             </a:fld>
             <a:endParaRPr lang="en-US"/>
           </a:p>
@@ -11631,8 +11634,8 @@
         </p:nvSpPr>
         <p:spPr>
           <a:xfrm>
-            <a:off x="311700" y="445025"/>
-            <a:ext cx="8520600" cy="572700"/>
+            <a:off x="-133220" y="133904"/>
+            <a:ext cx="7734529" cy="572700"/>
           </a:xfrm>
           <a:prstGeom prst="rect">
             <a:avLst/>
@@ -11648,10 +11651,19 @@
           </a:bodyPr>
           <a:lstStyle/>
           <a:p>
+            <a:pPr algn="ctr"/>
             <a:r>
               <a:rPr lang="ru-RU" dirty="0"/>
-              <a:t>Описательный портрет...</a:t>
-            </a:r>
+              <a:t>Описательный портрет </a:t>
+            </a:r>
+            <a:br>
+              <a:rPr lang="en-US" dirty="0"/>
+            </a:br>
+            <a:r>
+              <a:rPr lang="en-US" dirty="0"/>
+              <a:t>Star Wars: The Clone Wars</a:t>
+            </a:r>
+            <a:endParaRPr lang="ru-RU" dirty="0"/>
           </a:p>
         </p:txBody>
       </p:sp>
@@ -11667,8 +11679,8 @@
         </p:nvSpPr>
         <p:spPr>
           <a:xfrm>
-            <a:off x="311700" y="1152475"/>
-            <a:ext cx="8520600" cy="3416400"/>
+            <a:off x="0" y="604247"/>
+            <a:ext cx="9147277" cy="2583097"/>
           </a:xfrm>
           <a:prstGeom prst="rect">
             <a:avLst/>
@@ -11680,27 +11692,518 @@
         </p:spPr>
         <p:txBody>
           <a:bodyPr spcFirstLastPara="1" wrap="square" lIns="91425" tIns="91425" rIns="91425" bIns="91425" anchor="t" anchorCtr="0">
-            <a:normAutofit/>
+            <a:noAutofit/>
           </a:bodyPr>
           <a:lstStyle/>
           <a:p>
-            <a:pPr marL="0" lvl="0" indent="0" algn="l" rtl="0">
-              <a:lnSpc>
-                <a:spcPct val="115000"/>
-              </a:lnSpc>
-              <a:spcBef>
-                <a:spcPts val="0"/>
-              </a:spcBef>
-              <a:spcAft>
-                <a:spcPts val="1200"/>
-              </a:spcAft>
-              <a:buSzPts val="1800"/>
+            <a:pPr marL="114300" indent="0" algn="just">
               <a:buNone/>
             </a:pPr>
-            <a:endParaRPr/>
+            <a:endParaRPr lang="en-US" sz="1000" b="0" i="0" dirty="0">
+              <a:solidFill>
+                <a:srgbClr val="212121"/>
+              </a:solidFill>
+              <a:effectLst/>
+              <a:latin typeface="+mj-lt"/>
+            </a:endParaRPr>
+          </a:p>
+          <a:p>
+            <a:pPr marL="114300" indent="0" algn="just">
+              <a:buNone/>
+            </a:pPr>
+            <a:endParaRPr lang="en-US" sz="1000" dirty="0">
+              <a:solidFill>
+                <a:srgbClr val="212121"/>
+              </a:solidFill>
+              <a:latin typeface="+mj-lt"/>
+            </a:endParaRPr>
+          </a:p>
+          <a:p>
+            <a:pPr marL="114300" indent="0" algn="just">
+              <a:buNone/>
+            </a:pPr>
+            <a:endParaRPr lang="en-US" sz="1000" b="0" i="0" dirty="0">
+              <a:solidFill>
+                <a:srgbClr val="212121"/>
+              </a:solidFill>
+              <a:effectLst/>
+              <a:latin typeface="+mj-lt"/>
+            </a:endParaRPr>
+          </a:p>
+          <a:p>
+            <a:pPr marL="114300" indent="0" algn="just">
+              <a:buNone/>
+            </a:pPr>
+            <a:r>
+              <a:rPr lang="ru-RU" sz="1000" b="0" i="0" dirty="0">
+                <a:solidFill>
+                  <a:srgbClr val="212121"/>
+                </a:solidFill>
+                <a:effectLst/>
+                <a:latin typeface="+mj-lt"/>
+              </a:rPr>
+              <a:t>Хотелось бы сравнить два сезона "Звездные войны: война клонов" 2008 и 2014 годов.</a:t>
+            </a:r>
+            <a:endParaRPr lang="en-US" sz="1000" b="0" i="0" dirty="0">
+              <a:solidFill>
+                <a:srgbClr val="212121"/>
+              </a:solidFill>
+              <a:effectLst/>
+              <a:latin typeface="+mj-lt"/>
+            </a:endParaRPr>
+          </a:p>
+          <a:p>
+            <a:pPr marL="114300" indent="0" algn="just">
+              <a:buNone/>
+            </a:pPr>
+            <a:r>
+              <a:rPr lang="ru-RU" sz="1000" b="0" i="0" dirty="0">
+                <a:solidFill>
+                  <a:srgbClr val="212121"/>
+                </a:solidFill>
+                <a:effectLst/>
+                <a:latin typeface="+mj-lt"/>
+              </a:rPr>
+              <a:t>Первый сезон начал выходить в октябре 2008 году и закончился 20 марта 2009 года, а весь 6 сезон выпустили за один год и интересным может показаться, что второй сезон был выпущен полностью</a:t>
+            </a:r>
+            <a:r>
+              <a:rPr lang="ru-RU" sz="1000" i="0" dirty="0">
+                <a:solidFill>
+                  <a:srgbClr val="212121"/>
+                </a:solidFill>
+                <a:effectLst/>
+                <a:latin typeface="+mj-lt"/>
+              </a:rPr>
+              <a:t> в один день</a:t>
+            </a:r>
+            <a:r>
+              <a:rPr lang="ru-RU" sz="1000" b="0" i="0" dirty="0">
+                <a:solidFill>
+                  <a:srgbClr val="212121"/>
+                </a:solidFill>
+                <a:effectLst/>
+                <a:latin typeface="+mj-lt"/>
+              </a:rPr>
+              <a:t>.</a:t>
+            </a:r>
+          </a:p>
+          <a:p>
+            <a:pPr marL="114300" indent="0" algn="just">
+              <a:buNone/>
+            </a:pPr>
+            <a:endParaRPr lang="en-US" sz="1000" b="0" i="0" dirty="0">
+              <a:solidFill>
+                <a:srgbClr val="212121"/>
+              </a:solidFill>
+              <a:effectLst/>
+              <a:latin typeface="+mj-lt"/>
+            </a:endParaRPr>
+          </a:p>
+          <a:p>
+            <a:pPr marL="114300" indent="0" algn="just">
+              <a:buNone/>
+            </a:pPr>
+            <a:r>
+              <a:rPr lang="ru-RU" sz="1000" b="0" i="0" dirty="0" err="1">
+                <a:solidFill>
+                  <a:srgbClr val="212121"/>
+                </a:solidFill>
+                <a:effectLst/>
+                <a:latin typeface="+mj-lt"/>
+              </a:rPr>
+              <a:t>Нетфликс</a:t>
+            </a:r>
+            <a:r>
+              <a:rPr lang="ru-RU" sz="1000" b="0" i="0" dirty="0">
+                <a:solidFill>
+                  <a:srgbClr val="212121"/>
+                </a:solidFill>
+                <a:effectLst/>
+                <a:latin typeface="+mj-lt"/>
+              </a:rPr>
+              <a:t> выкупил права на мультсериал только в 2014 году, тем самым дав ему новую жизнь, т.к. </a:t>
+            </a:r>
+            <a:r>
+              <a:rPr lang="ru-RU" sz="1000" b="0" i="0" dirty="0" err="1">
+                <a:solidFill>
+                  <a:srgbClr val="212121"/>
+                </a:solidFill>
+                <a:effectLst/>
+                <a:latin typeface="+mj-lt"/>
+              </a:rPr>
+              <a:t>Lucasfilm</a:t>
+            </a:r>
+            <a:r>
+              <a:rPr lang="ru-RU" sz="1000" b="0" i="0" dirty="0">
+                <a:solidFill>
+                  <a:srgbClr val="212121"/>
+                </a:solidFill>
+                <a:effectLst/>
+                <a:latin typeface="+mj-lt"/>
+              </a:rPr>
+              <a:t> планировали закрыть сериал.</a:t>
+            </a:r>
+          </a:p>
+          <a:p>
+            <a:pPr marL="114300" indent="0" algn="just">
+              <a:buNone/>
+            </a:pPr>
+            <a:endParaRPr lang="en-US" sz="1000" b="0" i="0" dirty="0">
+              <a:solidFill>
+                <a:srgbClr val="212121"/>
+              </a:solidFill>
+              <a:effectLst/>
+              <a:latin typeface="+mj-lt"/>
+            </a:endParaRPr>
+          </a:p>
+          <a:p>
+            <a:pPr marL="114300" indent="0" algn="just">
+              <a:buNone/>
+            </a:pPr>
+            <a:r>
+              <a:rPr lang="ru-RU" sz="1000" b="0" i="0" dirty="0">
+                <a:solidFill>
+                  <a:srgbClr val="212121"/>
+                </a:solidFill>
+                <a:effectLst/>
+                <a:latin typeface="+mj-lt"/>
+              </a:rPr>
+              <a:t>Стоит отметить огромную разницу в оценке пользователей, первый сезон получил в два раза меньшие результаты по сравнению с шестым сезоном. Причин этому много: возросло качество графики и съемки, увеличился бюджет и т.д.</a:t>
+            </a:r>
+          </a:p>
+          <a:p>
+            <a:pPr marL="114300" indent="0" algn="just">
+              <a:buNone/>
+            </a:pPr>
+            <a:endParaRPr lang="en-US" sz="1000" b="0" i="0" dirty="0">
+              <a:solidFill>
+                <a:srgbClr val="212121"/>
+              </a:solidFill>
+              <a:effectLst/>
+              <a:latin typeface="+mj-lt"/>
+            </a:endParaRPr>
+          </a:p>
+          <a:p>
+            <a:pPr marL="114300" indent="0" algn="just">
+              <a:buNone/>
+            </a:pPr>
+            <a:r>
+              <a:rPr lang="ru-RU" sz="1000" b="0" i="0" dirty="0">
+                <a:solidFill>
+                  <a:srgbClr val="212121"/>
+                </a:solidFill>
+                <a:effectLst/>
+                <a:latin typeface="+mj-lt"/>
+              </a:rPr>
+              <a:t>Единственное шоу, которое абсолютно дублирует все параметры нашего шоу - это «Белый воротничок» - использующий клише “детективный сериал про мошенника на службе </a:t>
+            </a:r>
+            <a:r>
+              <a:rPr lang="ru-RU" sz="1000" b="0" i="0" dirty="0" err="1">
+                <a:solidFill>
+                  <a:srgbClr val="212121"/>
+                </a:solidFill>
+                <a:effectLst/>
+                <a:latin typeface="+mj-lt"/>
+              </a:rPr>
+              <a:t>фбр</a:t>
+            </a:r>
+            <a:r>
+              <a:rPr lang="ru-RU" sz="1000" b="0" i="0" dirty="0">
+                <a:solidFill>
+                  <a:srgbClr val="212121"/>
+                </a:solidFill>
+                <a:effectLst/>
+                <a:latin typeface="+mj-lt"/>
+              </a:rPr>
+              <a:t>”. Так же совпадает (на1 бал выше) комедийный сериал «Как я встретил вашу маму»</a:t>
+            </a:r>
+            <a:r>
+              <a:rPr lang="en-US" sz="1000" b="0" i="0" dirty="0">
+                <a:solidFill>
+                  <a:srgbClr val="212121"/>
+                </a:solidFill>
+                <a:effectLst/>
+                <a:latin typeface="+mj-lt"/>
+              </a:rPr>
+              <a:t> </a:t>
+            </a:r>
+            <a:r>
+              <a:rPr lang="ru-RU" sz="1000" b="0" i="0" dirty="0">
+                <a:solidFill>
+                  <a:srgbClr val="212121"/>
+                </a:solidFill>
+                <a:effectLst/>
+                <a:latin typeface="+mj-lt"/>
+              </a:rPr>
+              <a:t>и «</a:t>
+            </a:r>
+            <a:r>
+              <a:rPr lang="en-US" sz="1000" b="0" i="0" dirty="0">
+                <a:solidFill>
+                  <a:srgbClr val="212121"/>
+                </a:solidFill>
+                <a:effectLst/>
+                <a:latin typeface="+mj-lt"/>
+              </a:rPr>
+              <a:t>Hard of Dixie</a:t>
+            </a:r>
+            <a:r>
+              <a:rPr lang="ru-RU" sz="1000" b="0" i="0" dirty="0">
+                <a:solidFill>
+                  <a:srgbClr val="212121"/>
+                </a:solidFill>
+                <a:effectLst/>
+                <a:latin typeface="+mj-lt"/>
+              </a:rPr>
+              <a:t>»</a:t>
+            </a:r>
+            <a:r>
+              <a:rPr lang="en-US" sz="1000" b="0" i="0" dirty="0">
+                <a:solidFill>
+                  <a:srgbClr val="212121"/>
+                </a:solidFill>
+                <a:effectLst/>
+                <a:latin typeface="+mj-lt"/>
+              </a:rPr>
+              <a:t> (</a:t>
+            </a:r>
+            <a:r>
+              <a:rPr lang="ru-RU" sz="1000" b="0" i="0" dirty="0">
+                <a:solidFill>
+                  <a:srgbClr val="212121"/>
+                </a:solidFill>
+                <a:effectLst/>
+                <a:latin typeface="+mj-lt"/>
+              </a:rPr>
+              <a:t>год, возрастной рейтинг, кластер </a:t>
+            </a:r>
+            <a:r>
+              <a:rPr lang="en-US" sz="1000" b="0" i="0" dirty="0">
+                <a:solidFill>
+                  <a:srgbClr val="212121"/>
+                </a:solidFill>
+                <a:effectLst/>
+                <a:latin typeface="+mj-lt"/>
+              </a:rPr>
+              <a:t>DBSCAN.</a:t>
+            </a:r>
+            <a:endParaRPr lang="ru-RU" sz="1000" b="0" i="0" dirty="0">
+              <a:solidFill>
+                <a:srgbClr val="212121"/>
+              </a:solidFill>
+              <a:effectLst/>
+              <a:latin typeface="+mj-lt"/>
+            </a:endParaRPr>
+          </a:p>
+          <a:p>
+            <a:pPr marL="114300" indent="0" algn="just">
+              <a:buNone/>
+            </a:pPr>
+            <a:endParaRPr lang="en-US" sz="1000" b="0" i="0" dirty="0">
+              <a:solidFill>
+                <a:srgbClr val="212121"/>
+              </a:solidFill>
+              <a:effectLst/>
+              <a:latin typeface="+mj-lt"/>
+            </a:endParaRPr>
+          </a:p>
+          <a:p>
+            <a:pPr marL="114300" indent="0" algn="just">
+              <a:buNone/>
+            </a:pPr>
+            <a:r>
+              <a:rPr lang="ru-RU" sz="1000" b="0" i="0" dirty="0">
+                <a:solidFill>
+                  <a:srgbClr val="212121"/>
+                </a:solidFill>
+                <a:effectLst/>
+                <a:latin typeface="+mj-lt"/>
+              </a:rPr>
+              <a:t>Так же у шестого сезона можно заметить немного возросший возрастной рейтинг, это может быть связано с тем, что увеличилось количество сцен с сражениями.</a:t>
+            </a:r>
           </a:p>
         </p:txBody>
       </p:sp>
+      <p:pic>
+        <p:nvPicPr>
+          <p:cNvPr id="9" name="Picture 8">
+            <a:extLst>
+              <a:ext uri="{FF2B5EF4-FFF2-40B4-BE49-F238E27FC236}">
+                <a16:creationId xmlns:a16="http://schemas.microsoft.com/office/drawing/2014/main" id="{94F84295-D98B-E5F9-56CD-F8E31D7C72FD}"/>
+              </a:ext>
+            </a:extLst>
+          </p:cNvPr>
+          <p:cNvPicPr>
+            <a:picLocks noChangeAspect="1"/>
+          </p:cNvPicPr>
+          <p:nvPr/>
+        </p:nvPicPr>
+        <p:blipFill>
+          <a:blip r:embed="rId3"/>
+          <a:stretch>
+            <a:fillRect/>
+          </a:stretch>
+        </p:blipFill>
+        <p:spPr>
+          <a:xfrm>
+            <a:off x="3685498" y="3791591"/>
+            <a:ext cx="5458502" cy="1354496"/>
+          </a:xfrm>
+          <a:prstGeom prst="rect">
+            <a:avLst/>
+          </a:prstGeom>
+        </p:spPr>
+      </p:pic>
+      <p:pic>
+        <p:nvPicPr>
+          <p:cNvPr id="11" name="Picture 10">
+            <a:extLst>
+              <a:ext uri="{FF2B5EF4-FFF2-40B4-BE49-F238E27FC236}">
+                <a16:creationId xmlns:a16="http://schemas.microsoft.com/office/drawing/2014/main" id="{A6133501-F19B-4D66-0CE0-5C59FD7D7F2F}"/>
+              </a:ext>
+            </a:extLst>
+          </p:cNvPr>
+          <p:cNvPicPr>
+            <a:picLocks noChangeAspect="1"/>
+          </p:cNvPicPr>
+          <p:nvPr/>
+        </p:nvPicPr>
+        <p:blipFill>
+          <a:blip r:embed="rId4"/>
+          <a:stretch>
+            <a:fillRect/>
+          </a:stretch>
+        </p:blipFill>
+        <p:spPr>
+          <a:xfrm>
+            <a:off x="0" y="-6185"/>
+            <a:ext cx="813910" cy="1220864"/>
+          </a:xfrm>
+          <a:prstGeom prst="rect">
+            <a:avLst/>
+          </a:prstGeom>
+        </p:spPr>
+      </p:pic>
+      <p:pic>
+        <p:nvPicPr>
+          <p:cNvPr id="13" name="Picture 12">
+            <a:extLst>
+              <a:ext uri="{FF2B5EF4-FFF2-40B4-BE49-F238E27FC236}">
+                <a16:creationId xmlns:a16="http://schemas.microsoft.com/office/drawing/2014/main" id="{AACCA2C5-21AC-A66F-EB08-1909EF163E31}"/>
+              </a:ext>
+            </a:extLst>
+          </p:cNvPr>
+          <p:cNvPicPr>
+            <a:picLocks noChangeAspect="1"/>
+          </p:cNvPicPr>
+          <p:nvPr/>
+        </p:nvPicPr>
+        <p:blipFill>
+          <a:blip r:embed="rId5"/>
+          <a:stretch>
+            <a:fillRect/>
+          </a:stretch>
+        </p:blipFill>
+        <p:spPr>
+          <a:xfrm>
+            <a:off x="1634436" y="4019383"/>
+            <a:ext cx="815213" cy="1124116"/>
+          </a:xfrm>
+          <a:prstGeom prst="rect">
+            <a:avLst/>
+          </a:prstGeom>
+        </p:spPr>
+      </p:pic>
+      <p:pic>
+        <p:nvPicPr>
+          <p:cNvPr id="15" name="Picture 14">
+            <a:extLst>
+              <a:ext uri="{FF2B5EF4-FFF2-40B4-BE49-F238E27FC236}">
+                <a16:creationId xmlns:a16="http://schemas.microsoft.com/office/drawing/2014/main" id="{2FBB00BC-43E4-5442-9A1D-C1120102EC0F}"/>
+              </a:ext>
+            </a:extLst>
+          </p:cNvPr>
+          <p:cNvPicPr>
+            <a:picLocks noChangeAspect="1"/>
+          </p:cNvPicPr>
+          <p:nvPr/>
+        </p:nvPicPr>
+        <p:blipFill>
+          <a:blip r:embed="rId6"/>
+          <a:stretch>
+            <a:fillRect/>
+          </a:stretch>
+        </p:blipFill>
+        <p:spPr>
+          <a:xfrm>
+            <a:off x="732749" y="4019383"/>
+            <a:ext cx="769225" cy="1121079"/>
+          </a:xfrm>
+          <a:prstGeom prst="rect">
+            <a:avLst/>
+          </a:prstGeom>
+        </p:spPr>
+      </p:pic>
+      <p:pic>
+        <p:nvPicPr>
+          <p:cNvPr id="17" name="Picture 16">
+            <a:extLst>
+              <a:ext uri="{FF2B5EF4-FFF2-40B4-BE49-F238E27FC236}">
+                <a16:creationId xmlns:a16="http://schemas.microsoft.com/office/drawing/2014/main" id="{AEFFEEC4-EED6-CFB2-B071-6A93A003A368}"/>
+              </a:ext>
+            </a:extLst>
+          </p:cNvPr>
+          <p:cNvPicPr>
+            <a:picLocks noChangeAspect="1"/>
+          </p:cNvPicPr>
+          <p:nvPr/>
+        </p:nvPicPr>
+        <p:blipFill>
+          <a:blip r:embed="rId7"/>
+          <a:stretch>
+            <a:fillRect/>
+          </a:stretch>
+        </p:blipFill>
+        <p:spPr>
+          <a:xfrm>
+            <a:off x="2625267" y="4019384"/>
+            <a:ext cx="726068" cy="1124116"/>
+          </a:xfrm>
+          <a:prstGeom prst="rect">
+            <a:avLst/>
+          </a:prstGeom>
+        </p:spPr>
+      </p:pic>
+      <p:pic>
+        <p:nvPicPr>
+          <p:cNvPr id="19" name="Picture 18">
+            <a:extLst>
+              <a:ext uri="{FF2B5EF4-FFF2-40B4-BE49-F238E27FC236}">
+                <a16:creationId xmlns:a16="http://schemas.microsoft.com/office/drawing/2014/main" id="{992595FE-5E45-4231-EC02-4DEE530F21C7}"/>
+              </a:ext>
+            </a:extLst>
+          </p:cNvPr>
+          <p:cNvPicPr>
+            <a:picLocks noChangeAspect="1"/>
+          </p:cNvPicPr>
+          <p:nvPr/>
+        </p:nvPicPr>
+        <p:blipFill>
+          <a:blip r:embed="rId8"/>
+          <a:stretch>
+            <a:fillRect/>
+          </a:stretch>
+        </p:blipFill>
+        <p:spPr>
+          <a:xfrm>
+            <a:off x="5810436" y="1762"/>
+            <a:ext cx="3064206" cy="1409683"/>
+          </a:xfrm>
+          <a:prstGeom prst="rect">
+            <a:avLst/>
+          </a:prstGeom>
+        </p:spPr>
+      </p:pic>
     </p:spTree>
     <p:extLst>
       <p:ext uri="{BB962C8B-B14F-4D97-AF65-F5344CB8AC3E}">

</xml_diff>

<commit_message>
Added some explanation of r2 scores
for linear regression and knn
</commit_message>
<xml_diff>
--- a/EDA_group_slides.pptx
+++ b/EDA_group_slides.pptx
@@ -10494,7 +10494,7 @@
             <a:r>
               <a:rPr lang="ru-RU" dirty="0">
                 <a:solidFill>
-                  <a:srgbClr val="FF0000"/>
+                  <a:schemeClr val="bg2"/>
                 </a:solidFill>
               </a:rPr>
               <a:t>Наблюдается рост после 2010 и интенсивный рост после 2015 с пиком в 2017. Года, отсутствующие в таблице (1940-2017)</a:t>
@@ -10502,7 +10502,7 @@
             <a:r>
               <a:rPr lang="en-US" dirty="0">
                 <a:solidFill>
-                  <a:srgbClr val="FF0000"/>
+                  <a:schemeClr val="bg2"/>
                 </a:solidFill>
               </a:rPr>
               <a:t>,</a:t>
@@ -10510,7 +10510,7 @@
             <a:r>
               <a:rPr lang="ru-RU" dirty="0">
                 <a:solidFill>
-                  <a:srgbClr val="FF0000"/>
+                  <a:schemeClr val="bg2"/>
                 </a:solidFill>
               </a:rPr>
               <a:t> – 43</a:t>
@@ -10518,7 +10518,7 @@
             <a:r>
               <a:rPr lang="en-US" dirty="0">
                 <a:solidFill>
-                  <a:srgbClr val="FF0000"/>
+                  <a:schemeClr val="bg2"/>
                 </a:solidFill>
               </a:rPr>
               <a:t>;</a:t>
@@ -10526,7 +10526,7 @@
             <a:r>
               <a:rPr lang="ru-RU" dirty="0">
                 <a:solidFill>
-                  <a:srgbClr val="FF0000"/>
+                  <a:schemeClr val="bg2"/>
                 </a:solidFill>
               </a:rPr>
               <a:t> года присутствующие – 35, с 1989 нет ни одного пропущенного года.</a:t>
@@ -10538,7 +10538,7 @@
             </a:pPr>
             <a:endParaRPr lang="ru-RU" dirty="0">
               <a:solidFill>
-                <a:srgbClr val="FF0000"/>
+                <a:schemeClr val="bg2"/>
               </a:solidFill>
             </a:endParaRPr>
           </a:p>
@@ -10549,7 +10549,7 @@
             <a:r>
               <a:rPr lang="ru-RU" dirty="0" err="1">
                 <a:solidFill>
-                  <a:srgbClr val="00B050"/>
+                  <a:schemeClr val="bg2"/>
                 </a:solidFill>
               </a:rPr>
               <a:t>Нетфликс</a:t>
@@ -10557,7 +10557,7 @@
             <a:r>
               <a:rPr lang="ru-RU" dirty="0">
                 <a:solidFill>
-                  <a:srgbClr val="00B050"/>
+                  <a:schemeClr val="bg2"/>
                 </a:solidFill>
               </a:rPr>
               <a:t> не существовал до 1997</a:t>
@@ -10565,7 +10565,7 @@
             <a:r>
               <a:rPr lang="en-US" dirty="0">
                 <a:solidFill>
-                  <a:srgbClr val="00B050"/>
+                  <a:schemeClr val="bg2"/>
                 </a:solidFill>
               </a:rPr>
               <a:t>-</a:t>
@@ -10573,7 +10573,7 @@
             <a:r>
               <a:rPr lang="ru-RU" dirty="0" err="1">
                 <a:solidFill>
-                  <a:srgbClr val="00B050"/>
+                  <a:schemeClr val="bg2"/>
                 </a:solidFill>
               </a:rPr>
               <a:t>го</a:t>
@@ -10581,7 +10581,7 @@
             <a:r>
               <a:rPr lang="ru-RU" dirty="0">
                 <a:solidFill>
-                  <a:srgbClr val="00B050"/>
+                  <a:schemeClr val="bg2"/>
                 </a:solidFill>
               </a:rPr>
               <a:t> и запуска </a:t>
@@ -10589,7 +10589,7 @@
             <a:r>
               <a:rPr lang="ru-RU" dirty="0" err="1">
                 <a:solidFill>
-                  <a:srgbClr val="00B050"/>
+                  <a:schemeClr val="bg2"/>
                 </a:solidFill>
               </a:rPr>
               <a:t>стриминга</a:t>
@@ -10597,7 +10597,7 @@
             <a:r>
               <a:rPr lang="ru-RU" dirty="0">
                 <a:solidFill>
-                  <a:srgbClr val="00B050"/>
+                  <a:schemeClr val="bg2"/>
                 </a:solidFill>
               </a:rPr>
               <a:t> в 2007</a:t>
@@ -10605,7 +10605,7 @@
             <a:r>
               <a:rPr lang="en-US" dirty="0">
                 <a:solidFill>
-                  <a:srgbClr val="00B050"/>
+                  <a:schemeClr val="bg2"/>
                 </a:solidFill>
               </a:rPr>
               <a:t>-</a:t>
@@ -10613,7 +10613,7 @@
             <a:r>
               <a:rPr lang="ru-RU" dirty="0">
                 <a:solidFill>
-                  <a:srgbClr val="00B050"/>
+                  <a:schemeClr val="bg2"/>
                 </a:solidFill>
               </a:rPr>
               <a:t>м, но некоторые фильмы, снятые ранее этого времени, были выкуплены </a:t>
@@ -10621,7 +10621,7 @@
             <a:r>
               <a:rPr lang="ru-RU" dirty="0" err="1">
                 <a:solidFill>
-                  <a:srgbClr val="00B050"/>
+                  <a:schemeClr val="bg2"/>
                 </a:solidFill>
               </a:rPr>
               <a:t>Нетфликсом</a:t>
@@ -10629,7 +10629,7 @@
             <a:r>
               <a:rPr lang="ru-RU" dirty="0">
                 <a:solidFill>
-                  <a:srgbClr val="00B050"/>
+                  <a:schemeClr val="bg2"/>
                 </a:solidFill>
               </a:rPr>
               <a:t>. Поскольку считается, что старые фильмы не сильно интересуют публику, выкупались права только на редкие фильмы. Это и сформировало выброс.</a:t>
@@ -14615,7 +14615,7 @@
           </a:bodyPr>
           <a:lstStyle/>
           <a:p>
-            <a:pPr marL="114300" indent="0" algn="l">
+            <a:pPr marL="114300" indent="0" algn="just">
               <a:buNone/>
             </a:pPr>
             <a:r>
@@ -14682,7 +14682,7 @@
             </a:endParaRPr>
           </a:p>
           <a:p>
-            <a:pPr marL="114300" indent="0" algn="l">
+            <a:pPr marL="114300" indent="0" algn="just">
               <a:buNone/>
             </a:pPr>
             <a:r>
@@ -14703,27 +14703,85 @@
                 <a:effectLst/>
                 <a:latin typeface="Roboto"/>
               </a:rPr>
-              <a:t>: Несмотря на то, что год и возрастной рейтинг не </a:t>
-            </a:r>
-            <a:r>
-              <a:rPr lang="ru-RU" b="0" i="0" dirty="0" err="1">
+              <a:t>: Несмотря на то, что год и возрастной рейтинг не долж</a:t>
+            </a:r>
+            <a:r>
+              <a:rPr lang="ru-RU" dirty="0">
+                <a:solidFill>
+                  <a:srgbClr val="212121"/>
+                </a:solidFill>
+                <a:latin typeface="Roboto"/>
+              </a:rPr>
+              <a:t>н</a:t>
+            </a:r>
+            <a:r>
+              <a:rPr lang="ru-RU" b="0" i="0" dirty="0">
                 <a:solidFill>
                   <a:srgbClr val="212121"/>
                 </a:solidFill>
                 <a:effectLst/>
                 <a:latin typeface="Roboto"/>
               </a:rPr>
-              <a:t>должеы</a:t>
-            </a:r>
-            <a:r>
-              <a:rPr lang="ru-RU" b="0" i="0" dirty="0">
+              <a:t>ы влиять на рейтинги шоу, линейная регрессия справила</a:t>
+            </a:r>
+            <a:r>
+              <a:rPr lang="en-US" b="0" i="0" dirty="0">
                 <a:solidFill>
                   <a:srgbClr val="212121"/>
                 </a:solidFill>
                 <a:effectLst/>
                 <a:latin typeface="Roboto"/>
               </a:rPr>
-              <a:t> влиять на рейтинги шоу, линейная регрессия справилась неплохо.</a:t>
+              <a:t>cm</a:t>
+            </a:r>
+            <a:r>
+              <a:rPr lang="ru-RU" b="0" i="0" dirty="0">
+                <a:solidFill>
+                  <a:srgbClr val="212121"/>
+                </a:solidFill>
+                <a:effectLst/>
+                <a:latin typeface="Roboto"/>
+              </a:rPr>
+              <a:t>, </a:t>
+            </a:r>
+            <a:r>
+              <a:rPr lang="en-US" b="0" i="0" dirty="0">
+                <a:solidFill>
+                  <a:srgbClr val="212121"/>
+                </a:solidFill>
+                <a:effectLst/>
+                <a:latin typeface="Roboto"/>
+              </a:rPr>
+              <a:t>r2 -0.273 </a:t>
+            </a:r>
+            <a:r>
+              <a:rPr lang="ru-RU" b="0" i="0" dirty="0">
+                <a:solidFill>
+                  <a:srgbClr val="212121"/>
+                </a:solidFill>
+                <a:effectLst/>
+                <a:latin typeface="Roboto"/>
+              </a:rPr>
+              <a:t>говорит о слабо</a:t>
+            </a:r>
+            <a:r>
+              <a:rPr lang="ru-RU" dirty="0">
+                <a:solidFill>
+                  <a:srgbClr val="212121"/>
+                </a:solidFill>
+                <a:latin typeface="Roboto"/>
+              </a:rPr>
+              <a:t>й зависимости</a:t>
+            </a:r>
+            <a:r>
+              <a:rPr lang="ru-RU" b="0" i="0" dirty="0">
+                <a:solidFill>
+                  <a:srgbClr val="212121"/>
+                </a:solidFill>
+                <a:effectLst/>
+                <a:latin typeface="Roboto"/>
+              </a:rPr>
+              <a:t>.</a:t>
             </a:r>
           </a:p>
           <a:p>
@@ -15007,8 +15065,42 @@
                 <a:effectLst/>
                 <a:latin typeface="Roboto"/>
               </a:rPr>
-              <a:t>, но на пару единиц занижает среднее значение, а СТД остается довольно высоким, любопытно, что только 3 соседей дает такое значение в то время как остальные 2-10 чуть более близкое к истинному среднее и более низкую СТД. Тем не менее гистограмма вполне соответствует такой из наших первоначальных данных.</a:t>
-            </a:r>
+              <a:t>, но на пару единиц занижает среднее значение, а СТД остается довольно высоким, любопытно, что только 3 соседей дает такое значение в то время как остальные 2-10 чуть более близкое к истинному среднее и более низкую СТД. </a:t>
+            </a:r>
+            <a:r>
+              <a:rPr lang="en-US" dirty="0">
+                <a:solidFill>
+                  <a:srgbClr val="212121"/>
+                </a:solidFill>
+                <a:latin typeface="Roboto"/>
+              </a:rPr>
+              <a:t>R2 -0.632 </a:t>
+            </a:r>
+            <a:r>
+              <a:rPr lang="ru-RU" dirty="0">
+                <a:solidFill>
+                  <a:srgbClr val="212121"/>
+                </a:solidFill>
+                <a:latin typeface="Roboto"/>
+              </a:rPr>
+              <a:t>говорит об очень слабой зависимости </a:t>
+            </a:r>
+            <a:r>
+              <a:rPr lang="ru-RU">
+                <a:solidFill>
+                  <a:srgbClr val="212121"/>
+                </a:solidFill>
+                <a:latin typeface="Roboto"/>
+              </a:rPr>
+              <a:t>между данными.</a:t>
+            </a:r>
+            <a:endParaRPr lang="ru-RU" b="0" i="0" dirty="0">
+              <a:solidFill>
+                <a:srgbClr val="212121"/>
+              </a:solidFill>
+              <a:effectLst/>
+              <a:latin typeface="Roboto"/>
+            </a:endParaRPr>
           </a:p>
           <a:p>
             <a:pPr marL="114300" indent="0" algn="l">

</xml_diff>